<commit_message>
quick changes from 1st Oct
</commit_message>
<xml_diff>
--- a/files/tools/ppt/Startup Canvas_FacilitationDeck.pptx
+++ b/files/tools/ppt/Startup Canvas_FacilitationDeck.pptx
@@ -2724,62 +2724,6 @@
               <a:buNone/>
             </a:pPr>
             <a:r>
-              <a:t/>
-            </a:r>
-            <a:endParaRPr sz="2400"/>
-          </a:p>
-          <a:p>
-            <a:pPr indent="0" lvl="0" marL="0" rtl="0" algn="l">
-              <a:spcBef>
-                <a:spcPts val="0"/>
-              </a:spcBef>
-              <a:spcAft>
-                <a:spcPts val="0"/>
-              </a:spcAft>
-              <a:buNone/>
-            </a:pPr>
-            <a:r>
-              <a:t/>
-            </a:r>
-            <a:endParaRPr sz="2400"/>
-          </a:p>
-          <a:p>
-            <a:pPr indent="0" lvl="0" marL="0" rtl="0" algn="l">
-              <a:spcBef>
-                <a:spcPts val="0"/>
-              </a:spcBef>
-              <a:spcAft>
-                <a:spcPts val="0"/>
-              </a:spcAft>
-              <a:buNone/>
-            </a:pPr>
-            <a:r>
-              <a:rPr lang="en" sz="1000">
-                <a:latin typeface="IBM Plex Sans"/>
-                <a:ea typeface="IBM Plex Sans"/>
-                <a:cs typeface="IBM Plex Sans"/>
-                <a:sym typeface="IBM Plex Sans"/>
-              </a:rPr>
-              <a:t>BOOTCAMP ONE | DAY ONE </a:t>
-            </a:r>
-            <a:endParaRPr sz="1000">
-              <a:latin typeface="IBM Plex Sans"/>
-              <a:ea typeface="IBM Plex Sans"/>
-              <a:cs typeface="IBM Plex Sans"/>
-              <a:sym typeface="IBM Plex Sans"/>
-            </a:endParaRPr>
-          </a:p>
-          <a:p>
-            <a:pPr indent="0" lvl="0" marL="0" rtl="0" algn="l">
-              <a:spcBef>
-                <a:spcPts val="0"/>
-              </a:spcBef>
-              <a:spcAft>
-                <a:spcPts val="0"/>
-              </a:spcAft>
-              <a:buNone/>
-            </a:pPr>
-            <a:r>
               <a:rPr b="1" lang="en" sz="1400">
                 <a:solidFill>
                   <a:srgbClr val="3C78D8"/>
@@ -3180,7 +3124,7 @@
             <a:tbl>
               <a:tblPr>
                 <a:noFill/>
-                <a:tableStyleId>{EDAEAE87-DF48-498B-AB91-E42E81331532}</a:tableStyleId>
+                <a:tableStyleId>{9B1E8FFB-CA8B-4242-ACDB-2B63839A12B3}</a:tableStyleId>
               </a:tblPr>
               <a:tblGrid>
                 <a:gridCol w="716100"/>
@@ -7866,7 +7810,7 @@
                 <a:cs typeface="IBM Plex Sans"/>
                 <a:sym typeface="IBM Plex Sans"/>
               </a:rPr>
-              <a:t>It is possible that participants may not have a full view of their own startups and may not be able to map priorities comprehensively. A more informed view of priorities based on discussions with colleagues can be shared on day four.</a:t>
+              <a:t>It is possible that participants may not have a full view of their own startups and may not be able to map priorities comprehensively. They can come back to the tool afterward when they think they know the answers.</a:t>
             </a:r>
             <a:endParaRPr sz="1100">
               <a:solidFill>
@@ -7961,72 +7905,6 @@
             </a:pPr>
             <a:r>
               <a:t/>
-            </a:r>
-            <a:endParaRPr sz="2400"/>
-          </a:p>
-          <a:p>
-            <a:pPr indent="0" lvl="0" marL="0" rtl="0" algn="l">
-              <a:spcBef>
-                <a:spcPts val="0"/>
-              </a:spcBef>
-              <a:spcAft>
-                <a:spcPts val="0"/>
-              </a:spcAft>
-              <a:buNone/>
-            </a:pPr>
-            <a:r>
-              <a:t/>
-            </a:r>
-            <a:endParaRPr sz="2400"/>
-          </a:p>
-          <a:p>
-            <a:pPr indent="0" lvl="0" marL="0" rtl="0" algn="l">
-              <a:spcBef>
-                <a:spcPts val="0"/>
-              </a:spcBef>
-              <a:spcAft>
-                <a:spcPts val="0"/>
-              </a:spcAft>
-              <a:buNone/>
-            </a:pPr>
-            <a:r>
-              <a:t/>
-            </a:r>
-            <a:endParaRPr sz="2400"/>
-          </a:p>
-          <a:p>
-            <a:pPr indent="0" lvl="0" marL="0" rtl="0" algn="l">
-              <a:spcBef>
-                <a:spcPts val="0"/>
-              </a:spcBef>
-              <a:spcAft>
-                <a:spcPts val="0"/>
-              </a:spcAft>
-              <a:buNone/>
-            </a:pPr>
-            <a:r>
-              <a:t/>
-            </a:r>
-            <a:endParaRPr sz="2400"/>
-          </a:p>
-          <a:p>
-            <a:pPr indent="0" lvl="0" marL="0" rtl="0" algn="l">
-              <a:spcBef>
-                <a:spcPts val="0"/>
-              </a:spcBef>
-              <a:spcAft>
-                <a:spcPts val="0"/>
-              </a:spcAft>
-              <a:buNone/>
-            </a:pPr>
-            <a:r>
-              <a:rPr lang="en" sz="1000">
-                <a:latin typeface="IBM Plex Sans"/>
-                <a:ea typeface="IBM Plex Sans"/>
-                <a:cs typeface="IBM Plex Sans"/>
-                <a:sym typeface="IBM Plex Sans"/>
-              </a:rPr>
-              <a:t>BOOTCAMP ONE | DAY ONE </a:t>
             </a:r>
             <a:endParaRPr sz="1000">
               <a:latin typeface="IBM Plex Sans"/>
@@ -10222,7 +10100,7 @@
             <a:tbl>
               <a:tblPr>
                 <a:noFill/>
-                <a:tableStyleId>{EDAEAE87-DF48-498B-AB91-E42E81331532}</a:tableStyleId>
+                <a:tableStyleId>{9B1E8FFB-CA8B-4242-ACDB-2B63839A12B3}</a:tableStyleId>
               </a:tblPr>
               <a:tblGrid>
                 <a:gridCol w="1955525"/>

</xml_diff>